<commit_message>
20170823 04 bruno  - Update Sample PPT
</commit_message>
<xml_diff>
--- a/bundles/lincko/app/models/sample/sample.pptx
+++ b/bundles/lincko/app/models/sample/sample.pptx
@@ -5,10 +5,10 @@
     <p:sldMasterId id="2147483648" r:id="rId1"/>
   </p:sldMasterIdLst>
   <p:sldIdLst>
-    <p:sldId id="256" r:id="rId2"/>
-    <p:sldId id="257" r:id="rId3"/>
+    <p:sldId id="257" r:id="rId2"/>
+    <p:sldId id="258" r:id="rId3"/>
     <p:sldId id="259" r:id="rId4"/>
-    <p:sldId id="258" r:id="rId5"/>
+    <p:sldId id="260" r:id="rId5"/>
   </p:sldIdLst>
   <p:sldSz cx="12192000" cy="6858000"/>
   <p:notesSz cx="6858000" cy="9144000"/>
@@ -107,17 +107,12 @@
       </a:defRPr>
     </a:lvl9pPr>
   </p:defaultTextStyle>
-  <p:extLst>
-    <p:ext uri="{EFAFB233-063F-42B5-8137-9DF3F51BA10A}">
-      <p15:sldGuideLst xmlns:p15="http://schemas.microsoft.com/office/powerpoint/2012/main"/>
-    </p:ext>
-  </p:extLst>
 </p:presentation>
 </file>
 
 <file path=ppt/commentAuthors.xml><?xml version="1.0" encoding="utf-8"?>
 <p:cmAuthorLst xmlns:a="http://schemas.openxmlformats.org/drawingml/2006/main" xmlns:r="http://schemas.openxmlformats.org/officeDocument/2006/relationships" xmlns:p="http://schemas.openxmlformats.org/presentationml/2006/main">
-  <p:cmAuthor id="1" name="Bruno Martin" initials="BM" lastIdx="6" clrIdx="0">
+  <p:cmAuthor id="1" name="Bruno Martin" initials="BM" lastIdx="4" clrIdx="0">
     <p:extLst>
       <p:ext uri="{19B8F6BF-5375-455C-9EA6-DF929625EA0E}">
         <p15:presenceInfo xmlns:p15="http://schemas.microsoft.com/office/powerpoint/2012/main" userId="4a6a8261cb1094fe" providerId="Windows Live"/>
@@ -129,16 +124,16 @@
 
 <file path=ppt/comments/comment1.xml><?xml version="1.0" encoding="utf-8"?>
 <p:cmLst xmlns:a="http://schemas.openxmlformats.org/drawingml/2006/main" xmlns:r="http://schemas.openxmlformats.org/officeDocument/2006/relationships" xmlns:p="http://schemas.openxmlformats.org/presentationml/2006/main">
-  <p:cm authorId="1" dt="2017-08-21T20:43:01.135" idx="1">
+  <p:cm authorId="1" dt="2017-08-23T16:36:29.862" idx="1">
     <p:pos x="10" y="10"/>
     <p:text>https://&lt;lincko_question&gt;&lt;/lincko_question&gt;</p:text>
-    <p:extLst mod="1">
+    <p:extLst>
       <p:ext uri="{C676402C-5697-4E1C-873F-D02D1690AC5C}">
         <p15:threadingInfo xmlns:p15="http://schemas.microsoft.com/office/powerpoint/2012/main" timeZoneBias="-480"/>
       </p:ext>
     </p:extLst>
   </p:cm>
-  <p:cm authorId="1" dt="2017-08-23T13:35:47.717" idx="5">
+  <p:cm authorId="1" dt="2017-08-23T16:36:41.767" idx="2">
     <p:pos x="106" y="106"/>
     <p:text>&lt;lincko_info&gt;&lt;/lincko_info&gt;</p:text>
     <p:extLst>
@@ -152,16 +147,16 @@
 
 <file path=ppt/comments/comment2.xml><?xml version="1.0" encoding="utf-8"?>
 <p:cmLst xmlns:a="http://schemas.openxmlformats.org/drawingml/2006/main" xmlns:r="http://schemas.openxmlformats.org/officeDocument/2006/relationships" xmlns:p="http://schemas.openxmlformats.org/presentationml/2006/main">
-  <p:cm authorId="1" dt="2017-08-21T20:43:01.135" idx="1">
+  <p:cm authorId="1" dt="2017-08-23T16:36:58.636" idx="3">
     <p:pos x="10" y="10"/>
     <p:text>https://&lt;lincko_answer&gt;&lt;/lincko_answer&gt;</p:text>
-    <p:extLst mod="1">
+    <p:extLst>
       <p:ext uri="{C676402C-5697-4E1C-873F-D02D1690AC5C}">
         <p15:threadingInfo xmlns:p15="http://schemas.microsoft.com/office/powerpoint/2012/main" timeZoneBias="-480"/>
       </p:ext>
     </p:extLst>
   </p:cm>
-  <p:cm authorId="1" dt="2017-08-23T13:35:56.247" idx="6">
+  <p:cm authorId="1" dt="2017-08-23T16:37:07.629" idx="4">
     <p:pos x="106" y="106"/>
     <p:text>&lt;lincko_info&gt;&lt;/lincko_info&gt;</p:text>
     <p:extLst>
@@ -6112,7 +6107,7 @@
     </p:spTree>
     <p:extLst>
       <p:ext uri="{BB962C8B-B14F-4D97-AF65-F5344CB8AC3E}">
-        <p14:creationId xmlns:p14="http://schemas.microsoft.com/office/powerpoint/2010/main" val="3175205558"/>
+        <p14:creationId xmlns:p14="http://schemas.microsoft.com/office/powerpoint/2010/main" val="1427321815"/>
       </p:ext>
     </p:extLst>
   </p:cSld>
@@ -6146,8 +6141,8 @@
           <a:chExt cx="0" cy="0"/>
         </a:xfrm>
       </p:grpSpPr>
-      <mc:AlternateContent xmlns:mc="http://schemas.openxmlformats.org/markup-compatibility/2006" xmlns:we="http://schemas.microsoft.com/office/webextensions/webextension/2010/11" xmlns:pca="http://schemas.microsoft.com/office/powerpoint/2013/contentapp">
-        <mc:Choice Requires="we pca">
+      <mc:AlternateContent xmlns:mc="http://schemas.openxmlformats.org/markup-compatibility/2006">
+        <mc:Choice xmlns:we="http://schemas.microsoft.com/office/webextensions/webextension/2010/11" xmlns:pca="http://schemas.microsoft.com/office/powerpoint/2013/contentapp" Requires="we pca">
           <p:graphicFrame>
             <p:nvGraphicFramePr>
               <p:cNvPr id="2" name="App 1"/>
@@ -6157,7 +6152,7 @@
               <p:nvPr>
                 <p:extLst>
                   <p:ext uri="{D42A27DB-BD31-4B8C-83A1-F6EECF244321}">
-                    <p14:modId xmlns:p14="http://schemas.microsoft.com/office/powerpoint/2010/main" val="2490527573"/>
+                    <p14:modId xmlns:p14="http://schemas.microsoft.com/office/powerpoint/2010/main" val="2256842021"/>
                   </p:ext>
                 </p:extLst>
               </p:nvPr>
@@ -6173,7 +6168,7 @@
             </a:graphic>
           </p:graphicFrame>
         </mc:Choice>
-        <mc:Fallback xmlns="">
+        <mc:Fallback>
           <p:pic>
             <p:nvPicPr>
               <p:cNvPr id="2" name="App 1"/>
@@ -6203,20 +6198,13 @@
     </p:spTree>
     <p:extLst>
       <p:ext uri="{BB962C8B-B14F-4D97-AF65-F5344CB8AC3E}">
-        <p14:creationId xmlns:p14="http://schemas.microsoft.com/office/powerpoint/2010/main" val="1900576061"/>
+        <p14:creationId xmlns:p14="http://schemas.microsoft.com/office/powerpoint/2010/main" val="425281607"/>
       </p:ext>
     </p:extLst>
   </p:cSld>
   <p:clrMapOvr>
     <a:masterClrMapping/>
   </p:clrMapOvr>
-  <p:timing>
-    <p:tnLst>
-      <p:par>
-        <p:cTn id="1" dur="indefinite" restart="never" nodeType="tmRoot"/>
-      </p:par>
-    </p:tnLst>
-  </p:timing>
 </p:sld>
 </file>
 
@@ -6237,8 +6225,8 @@
           <a:chExt cx="0" cy="0"/>
         </a:xfrm>
       </p:grpSpPr>
-      <mc:AlternateContent xmlns:mc="http://schemas.openxmlformats.org/markup-compatibility/2006" xmlns:we="http://schemas.microsoft.com/office/webextensions/webextension/2010/11" xmlns:pca="http://schemas.microsoft.com/office/powerpoint/2013/contentapp">
-        <mc:Choice Requires="we pca">
+      <mc:AlternateContent xmlns:mc="http://schemas.openxmlformats.org/markup-compatibility/2006">
+        <mc:Choice xmlns:we="http://schemas.microsoft.com/office/webextensions/webextension/2010/11" xmlns:pca="http://schemas.microsoft.com/office/powerpoint/2013/contentapp" Requires="we pca">
           <p:graphicFrame>
             <p:nvGraphicFramePr>
               <p:cNvPr id="2" name="App 1"/>
@@ -6248,7 +6236,7 @@
               <p:nvPr>
                 <p:extLst>
                   <p:ext uri="{D42A27DB-BD31-4B8C-83A1-F6EECF244321}">
-                    <p14:modId xmlns:p14="http://schemas.microsoft.com/office/powerpoint/2010/main" val="2490527573"/>
+                    <p14:modId xmlns:p14="http://schemas.microsoft.com/office/powerpoint/2010/main" val="2232357323"/>
                   </p:ext>
                 </p:extLst>
               </p:nvPr>
@@ -6264,7 +6252,7 @@
             </a:graphic>
           </p:graphicFrame>
         </mc:Choice>
-        <mc:Fallback xmlns="">
+        <mc:Fallback>
           <p:pic>
             <p:nvPicPr>
               <p:cNvPr id="2" name="App 1"/>
@@ -6294,20 +6282,13 @@
     </p:spTree>
     <p:extLst>
       <p:ext uri="{BB962C8B-B14F-4D97-AF65-F5344CB8AC3E}">
-        <p14:creationId xmlns:p14="http://schemas.microsoft.com/office/powerpoint/2010/main" val="3305200434"/>
+        <p14:creationId xmlns:p14="http://schemas.microsoft.com/office/powerpoint/2010/main" val="2963134938"/>
       </p:ext>
     </p:extLst>
   </p:cSld>
   <p:clrMapOvr>
     <a:masterClrMapping/>
   </p:clrMapOvr>
-  <p:timing>
-    <p:tnLst>
-      <p:par>
-        <p:cTn id="1" dur="indefinite" restart="never" nodeType="tmRoot"/>
-      </p:par>
-    </p:tnLst>
-  </p:timing>
 </p:sld>
 </file>
 
@@ -6361,7 +6342,7 @@
     </p:spTree>
     <p:extLst>
       <p:ext uri="{BB962C8B-B14F-4D97-AF65-F5344CB8AC3E}">
-        <p14:creationId xmlns:p14="http://schemas.microsoft.com/office/powerpoint/2010/main" val="2938916108"/>
+        <p14:creationId xmlns:p14="http://schemas.microsoft.com/office/powerpoint/2010/main" val="749603494"/>
       </p:ext>
     </p:extLst>
   </p:cSld>
@@ -6628,7 +6609,7 @@
 </file>
 
 <file path=ppt/webextensions/webextension1.xml><?xml version="1.0" encoding="utf-8"?>
-<we:webextension xmlns:we="http://schemas.microsoft.com/office/webextensions/webextension/2010/11" id="{A1BD9A8E-430C-474A-8EE2-B84D0F8B4083}">
+<we:webextension xmlns:we="http://schemas.microsoft.com/office/webextensions/webextension/2010/11" id="{90FC060A-F1DF-4665-808E-C839A3FC3321}">
   <we:reference id="wa104295828" version="1.6.0.0" store="en-US" storeType="OMEX"/>
   <we:alternateReferences/>
   <we:properties>
@@ -6640,7 +6621,7 @@
 </file>
 
 <file path=ppt/webextensions/webextension2.xml><?xml version="1.0" encoding="utf-8"?>
-<we:webextension xmlns:we="http://schemas.microsoft.com/office/webextensions/webextension/2010/11" id="{94F755F5-626F-4754-B037-E472FCBCEA05}">
+<we:webextension xmlns:we="http://schemas.microsoft.com/office/webextensions/webextension/2010/11" id="{2908268A-78FA-4242-8E74-DDC2FFBC2E7B}">
   <we:reference id="wa104295828" version="1.6.0.0" store="en-US" storeType="OMEX"/>
   <we:alternateReferences/>
   <we:properties>

</xml_diff>